<commit_message>
updated docs (TODOs are wip)
</commit_message>
<xml_diff>
--- a/docs/images/diagrams.pptx
+++ b/docs/images/diagrams.pptx
@@ -261,7 +261,7 @@
           <a:p>
             <a:fld id="{E1401BA4-237C-B44E-BFA4-C7505F294036}" type="datetimeFigureOut">
               <a:rPr lang="en-US" smtClean="0"/>
-              <a:t>4/9/2021</a:t>
+              <a:t>4/20/2021</a:t>
             </a:fld>
             <a:endParaRPr lang="en-US"/>
           </a:p>
@@ -459,7 +459,7 @@
           <a:p>
             <a:fld id="{E1401BA4-237C-B44E-BFA4-C7505F294036}" type="datetimeFigureOut">
               <a:rPr lang="en-US" smtClean="0"/>
-              <a:t>4/9/2021</a:t>
+              <a:t>4/20/2021</a:t>
             </a:fld>
             <a:endParaRPr lang="en-US"/>
           </a:p>
@@ -667,7 +667,7 @@
           <a:p>
             <a:fld id="{E1401BA4-237C-B44E-BFA4-C7505F294036}" type="datetimeFigureOut">
               <a:rPr lang="en-US" smtClean="0"/>
-              <a:t>4/9/2021</a:t>
+              <a:t>4/20/2021</a:t>
             </a:fld>
             <a:endParaRPr lang="en-US"/>
           </a:p>
@@ -865,7 +865,7 @@
           <a:p>
             <a:fld id="{E1401BA4-237C-B44E-BFA4-C7505F294036}" type="datetimeFigureOut">
               <a:rPr lang="en-US" smtClean="0"/>
-              <a:t>4/9/2021</a:t>
+              <a:t>4/20/2021</a:t>
             </a:fld>
             <a:endParaRPr lang="en-US"/>
           </a:p>
@@ -1140,7 +1140,7 @@
           <a:p>
             <a:fld id="{E1401BA4-237C-B44E-BFA4-C7505F294036}" type="datetimeFigureOut">
               <a:rPr lang="en-US" smtClean="0"/>
-              <a:t>4/9/2021</a:t>
+              <a:t>4/20/2021</a:t>
             </a:fld>
             <a:endParaRPr lang="en-US"/>
           </a:p>
@@ -1405,7 +1405,7 @@
           <a:p>
             <a:fld id="{E1401BA4-237C-B44E-BFA4-C7505F294036}" type="datetimeFigureOut">
               <a:rPr lang="en-US" smtClean="0"/>
-              <a:t>4/9/2021</a:t>
+              <a:t>4/20/2021</a:t>
             </a:fld>
             <a:endParaRPr lang="en-US"/>
           </a:p>
@@ -1817,7 +1817,7 @@
           <a:p>
             <a:fld id="{E1401BA4-237C-B44E-BFA4-C7505F294036}" type="datetimeFigureOut">
               <a:rPr lang="en-US" smtClean="0"/>
-              <a:t>4/9/2021</a:t>
+              <a:t>4/20/2021</a:t>
             </a:fld>
             <a:endParaRPr lang="en-US"/>
           </a:p>
@@ -1958,7 +1958,7 @@
           <a:p>
             <a:fld id="{E1401BA4-237C-B44E-BFA4-C7505F294036}" type="datetimeFigureOut">
               <a:rPr lang="en-US" smtClean="0"/>
-              <a:t>4/9/2021</a:t>
+              <a:t>4/20/2021</a:t>
             </a:fld>
             <a:endParaRPr lang="en-US"/>
           </a:p>
@@ -2071,7 +2071,7 @@
           <a:p>
             <a:fld id="{E1401BA4-237C-B44E-BFA4-C7505F294036}" type="datetimeFigureOut">
               <a:rPr lang="en-US" smtClean="0"/>
-              <a:t>4/9/2021</a:t>
+              <a:t>4/20/2021</a:t>
             </a:fld>
             <a:endParaRPr lang="en-US"/>
           </a:p>
@@ -2382,7 +2382,7 @@
           <a:p>
             <a:fld id="{E1401BA4-237C-B44E-BFA4-C7505F294036}" type="datetimeFigureOut">
               <a:rPr lang="en-US" smtClean="0"/>
-              <a:t>4/9/2021</a:t>
+              <a:t>4/20/2021</a:t>
             </a:fld>
             <a:endParaRPr lang="en-US"/>
           </a:p>
@@ -2670,7 +2670,7 @@
           <a:p>
             <a:fld id="{E1401BA4-237C-B44E-BFA4-C7505F294036}" type="datetimeFigureOut">
               <a:rPr lang="en-US" smtClean="0"/>
-              <a:t>4/9/2021</a:t>
+              <a:t>4/20/2021</a:t>
             </a:fld>
             <a:endParaRPr lang="en-US"/>
           </a:p>
@@ -2911,7 +2911,7 @@
           <a:p>
             <a:fld id="{E1401BA4-237C-B44E-BFA4-C7505F294036}" type="datetimeFigureOut">
               <a:rPr lang="en-US" smtClean="0"/>
-              <a:t>4/9/2021</a:t>
+              <a:t>4/20/2021</a:t>
             </a:fld>
             <a:endParaRPr lang="en-US"/>
           </a:p>
@@ -3416,9 +3416,10 @@
           <a:p>
             <a:pPr algn="ctr"/>
             <a:r>
-              <a:rPr lang="en-US" dirty="0"/>
-              <a:t>AzureSharedResource</a:t>
-            </a:r>
+              <a:rPr lang="en-US" dirty="0" err="1"/>
+              <a:t>SharedResource</a:t>
+            </a:r>
+            <a:endParaRPr lang="en-US" dirty="0"/>
           </a:p>
         </p:txBody>
       </p:sp>
@@ -4062,9 +4063,10 @@
             <a:p>
               <a:pPr algn="ctr"/>
               <a:r>
-                <a:rPr lang="en-US" dirty="0"/>
-                <a:t>AzureSharedResource</a:t>
+                <a:rPr lang="en-US" dirty="0" err="1"/>
+                <a:t>SharedResource</a:t>
               </a:r>
+              <a:endParaRPr lang="en-US" dirty="0"/>
             </a:p>
           </p:txBody>
         </p:sp>
@@ -4177,9 +4179,10 @@
             <a:p>
               <a:pPr algn="ctr"/>
               <a:r>
-                <a:rPr lang="en-US" dirty="0"/>
-                <a:t>AzureSharedResource</a:t>
+                <a:rPr lang="en-US" dirty="0" err="1"/>
+                <a:t>SharedResource</a:t>
               </a:r>
+              <a:endParaRPr lang="en-US" dirty="0"/>
             </a:p>
           </p:txBody>
         </p:sp>
@@ -5410,7 +5413,15 @@
             </a:pPr>
             <a:r>
               <a:rPr lang="en-US" sz="1400" dirty="0"/>
-              <a:t>The AzureSharedResource leases partitions so that it can safely use capacity.</a:t>
+              <a:t>The </a:t>
+            </a:r>
+            <a:r>
+              <a:rPr lang="en-US" sz="1400" dirty="0" err="1"/>
+              <a:t>SharedResource</a:t>
+            </a:r>
+            <a:r>
+              <a:rPr lang="en-US" sz="1400" dirty="0"/>
+              <a:t> leases partitions so that it can safely use capacity.</a:t>
             </a:r>
           </a:p>
           <a:p>

</xml_diff>